<commit_message>
final version minus 0.5 with all figures done apart from those who have a problem
</commit_message>
<xml_diff>
--- a/_figure/results/solute.spce.pptx
+++ b/_figure/results/solute.spce.pptx
@@ -309,7 +309,7 @@
                   <c:v>4.04166666666666</c:v>
                 </c:pt>
                 <c:pt idx="50" formatCode="General">
-                  <c:v>4.124999999999999</c:v>
+                  <c:v>4.124999999999997</c:v>
                 </c:pt>
                 <c:pt idx="51" formatCode="General">
                   <c:v>4.20833333333333</c:v>
@@ -327,7 +327,7 @@
                   <c:v>4.54166666666666</c:v>
                 </c:pt>
                 <c:pt idx="56" formatCode="General">
-                  <c:v>4.624999999999999</c:v>
+                  <c:v>4.624999999999997</c:v>
                 </c:pt>
                 <c:pt idx="57" formatCode="General">
                   <c:v>4.70833333333333</c:v>
@@ -345,7 +345,7 @@
                   <c:v>5.04166666666666</c:v>
                 </c:pt>
                 <c:pt idx="62" formatCode="General">
-                  <c:v>5.124999999999999</c:v>
+                  <c:v>5.124999999999997</c:v>
                 </c:pt>
                 <c:pt idx="63" formatCode="General">
                   <c:v>5.20833333333333</c:v>
@@ -363,7 +363,7 @@
                   <c:v>5.54166666666666</c:v>
                 </c:pt>
                 <c:pt idx="68" formatCode="General">
-                  <c:v>5.624999999999999</c:v>
+                  <c:v>5.624999999999997</c:v>
                 </c:pt>
                 <c:pt idx="69" formatCode="General">
                   <c:v>5.70833333333333</c:v>
@@ -381,7 +381,7 @@
                   <c:v>6.04166666666666</c:v>
                 </c:pt>
                 <c:pt idx="74" formatCode="General">
-                  <c:v>6.124999999999999</c:v>
+                  <c:v>6.124999999999997</c:v>
                 </c:pt>
                 <c:pt idx="75" formatCode="General">
                   <c:v>6.20833333333333</c:v>
@@ -399,7 +399,7 @@
                   <c:v>6.54166666666666</c:v>
                 </c:pt>
                 <c:pt idx="80" formatCode="General">
-                  <c:v>6.624999999999999</c:v>
+                  <c:v>6.624999999999997</c:v>
                 </c:pt>
                 <c:pt idx="81" formatCode="General">
                   <c:v>6.70833333333333</c:v>
@@ -417,7 +417,7 @@
                   <c:v>7.04166666666666</c:v>
                 </c:pt>
                 <c:pt idx="86" formatCode="General">
-                  <c:v>7.124999999999999</c:v>
+                  <c:v>7.124999999999997</c:v>
                 </c:pt>
                 <c:pt idx="87" formatCode="General">
                   <c:v>7.20833333333333</c:v>
@@ -435,7 +435,7 @@
                   <c:v>7.54166666666666</c:v>
                 </c:pt>
                 <c:pt idx="92" formatCode="General">
-                  <c:v>7.624999999999999</c:v>
+                  <c:v>7.624999999999997</c:v>
                 </c:pt>
                 <c:pt idx="93" formatCode="General">
                   <c:v>7.70833333333333</c:v>
@@ -456,7 +456,7 @@
                   <c:v>8.125</c:v>
                 </c:pt>
                 <c:pt idx="99" formatCode="General">
-                  <c:v>8.208333333333329</c:v>
+                  <c:v>8.208333333333327</c:v>
                 </c:pt>
                 <c:pt idx="100" formatCode="General">
                   <c:v>8.29166666666666</c:v>
@@ -474,7 +474,7 @@
                   <c:v>8.625</c:v>
                 </c:pt>
                 <c:pt idx="105" formatCode="General">
-                  <c:v>8.708333333333329</c:v>
+                  <c:v>8.708333333333327</c:v>
                 </c:pt>
                 <c:pt idx="106" formatCode="General">
                   <c:v>8.79166666666666</c:v>
@@ -492,7 +492,7 @@
                   <c:v>9.125</c:v>
                 </c:pt>
                 <c:pt idx="111" formatCode="General">
-                  <c:v>9.208333333333329</c:v>
+                  <c:v>9.208333333333327</c:v>
                 </c:pt>
                 <c:pt idx="112" formatCode="General">
                   <c:v>9.29166666666666</c:v>
@@ -510,7 +510,7 @@
                   <c:v>9.625</c:v>
                 </c:pt>
                 <c:pt idx="117" formatCode="General">
-                  <c:v>9.708333333333329</c:v>
+                  <c:v>9.708333333333327</c:v>
                 </c:pt>
                 <c:pt idx="118" formatCode="General">
                   <c:v>9.79166666666666</c:v>
@@ -954,7 +954,7 @@
                   <c:v>1.0066010924308</c:v>
                 </c:pt>
                 <c:pt idx="117">
-                  <c:v>1.007929302489169</c:v>
+                  <c:v>1.007929302489168</c:v>
                 </c:pt>
                 <c:pt idx="118">
                   <c:v>1.0079852754794</c:v>
@@ -1224,7 +1224,7 @@
                   <c:v>4.04166666666666</c:v>
                 </c:pt>
                 <c:pt idx="50" formatCode="General">
-                  <c:v>4.124999999999999</c:v>
+                  <c:v>4.124999999999997</c:v>
                 </c:pt>
                 <c:pt idx="51" formatCode="General">
                   <c:v>4.20833333333333</c:v>
@@ -1242,7 +1242,7 @@
                   <c:v>4.54166666666666</c:v>
                 </c:pt>
                 <c:pt idx="56" formatCode="General">
-                  <c:v>4.624999999999999</c:v>
+                  <c:v>4.624999999999997</c:v>
                 </c:pt>
                 <c:pt idx="57" formatCode="General">
                   <c:v>4.70833333333333</c:v>
@@ -1260,7 +1260,7 @@
                   <c:v>5.04166666666666</c:v>
                 </c:pt>
                 <c:pt idx="62" formatCode="General">
-                  <c:v>5.124999999999999</c:v>
+                  <c:v>5.124999999999997</c:v>
                 </c:pt>
                 <c:pt idx="63" formatCode="General">
                   <c:v>5.20833333333333</c:v>
@@ -1278,7 +1278,7 @@
                   <c:v>5.54166666666666</c:v>
                 </c:pt>
                 <c:pt idx="68" formatCode="General">
-                  <c:v>5.624999999999999</c:v>
+                  <c:v>5.624999999999997</c:v>
                 </c:pt>
                 <c:pt idx="69" formatCode="General">
                   <c:v>5.70833333333333</c:v>
@@ -1296,7 +1296,7 @@
                   <c:v>6.04166666666666</c:v>
                 </c:pt>
                 <c:pt idx="74" formatCode="General">
-                  <c:v>6.124999999999999</c:v>
+                  <c:v>6.124999999999997</c:v>
                 </c:pt>
                 <c:pt idx="75" formatCode="General">
                   <c:v>6.20833333333333</c:v>
@@ -1314,7 +1314,7 @@
                   <c:v>6.54166666666666</c:v>
                 </c:pt>
                 <c:pt idx="80" formatCode="General">
-                  <c:v>6.624999999999999</c:v>
+                  <c:v>6.624999999999997</c:v>
                 </c:pt>
                 <c:pt idx="81" formatCode="General">
                   <c:v>6.70833333333333</c:v>
@@ -1332,7 +1332,7 @@
                   <c:v>7.04166666666666</c:v>
                 </c:pt>
                 <c:pt idx="86" formatCode="General">
-                  <c:v>7.124999999999999</c:v>
+                  <c:v>7.124999999999997</c:v>
                 </c:pt>
                 <c:pt idx="87" formatCode="General">
                   <c:v>7.20833333333333</c:v>
@@ -1350,7 +1350,7 @@
                   <c:v>7.54166666666666</c:v>
                 </c:pt>
                 <c:pt idx="92" formatCode="General">
-                  <c:v>7.624999999999999</c:v>
+                  <c:v>7.624999999999997</c:v>
                 </c:pt>
                 <c:pt idx="93" formatCode="General">
                   <c:v>7.70833333333333</c:v>
@@ -1371,7 +1371,7 @@
                   <c:v>8.125</c:v>
                 </c:pt>
                 <c:pt idx="99" formatCode="General">
-                  <c:v>8.208333333333329</c:v>
+                  <c:v>8.208333333333327</c:v>
                 </c:pt>
                 <c:pt idx="100" formatCode="General">
                   <c:v>8.29166666666666</c:v>
@@ -1389,7 +1389,7 @@
                   <c:v>8.625</c:v>
                 </c:pt>
                 <c:pt idx="105" formatCode="General">
-                  <c:v>8.708333333333329</c:v>
+                  <c:v>8.708333333333327</c:v>
                 </c:pt>
                 <c:pt idx="106" formatCode="General">
                   <c:v>8.79166666666666</c:v>
@@ -1407,7 +1407,7 @@
                   <c:v>9.125</c:v>
                 </c:pt>
                 <c:pt idx="111" formatCode="General">
-                  <c:v>9.208333333333329</c:v>
+                  <c:v>9.208333333333327</c:v>
                 </c:pt>
                 <c:pt idx="112" formatCode="General">
                   <c:v>9.29166666666666</c:v>
@@ -1425,7 +1425,7 @@
                   <c:v>9.625</c:v>
                 </c:pt>
                 <c:pt idx="117" formatCode="General">
-                  <c:v>9.708333333333329</c:v>
+                  <c:v>9.708333333333327</c:v>
                 </c:pt>
                 <c:pt idx="118" formatCode="General">
                   <c:v>9.79166666666666</c:v>
@@ -2141,7 +2141,7 @@
                   <c:v>4.04166666666666</c:v>
                 </c:pt>
                 <c:pt idx="50" formatCode="General">
-                  <c:v>4.124999999999999</c:v>
+                  <c:v>4.124999999999997</c:v>
                 </c:pt>
                 <c:pt idx="51" formatCode="General">
                   <c:v>4.20833333333333</c:v>
@@ -2159,7 +2159,7 @@
                   <c:v>4.54166666666666</c:v>
                 </c:pt>
                 <c:pt idx="56" formatCode="General">
-                  <c:v>4.624999999999999</c:v>
+                  <c:v>4.624999999999997</c:v>
                 </c:pt>
                 <c:pt idx="57" formatCode="General">
                   <c:v>4.70833333333333</c:v>
@@ -2177,7 +2177,7 @@
                   <c:v>5.04166666666666</c:v>
                 </c:pt>
                 <c:pt idx="62" formatCode="General">
-                  <c:v>5.124999999999999</c:v>
+                  <c:v>5.124999999999997</c:v>
                 </c:pt>
                 <c:pt idx="63" formatCode="General">
                   <c:v>5.20833333333333</c:v>
@@ -2195,7 +2195,7 @@
                   <c:v>5.54166666666666</c:v>
                 </c:pt>
                 <c:pt idx="68" formatCode="General">
-                  <c:v>5.624999999999999</c:v>
+                  <c:v>5.624999999999997</c:v>
                 </c:pt>
                 <c:pt idx="69" formatCode="General">
                   <c:v>5.70833333333333</c:v>
@@ -2213,7 +2213,7 @@
                   <c:v>6.04166666666666</c:v>
                 </c:pt>
                 <c:pt idx="74" formatCode="General">
-                  <c:v>6.124999999999999</c:v>
+                  <c:v>6.124999999999997</c:v>
                 </c:pt>
                 <c:pt idx="75" formatCode="General">
                   <c:v>6.20833333333333</c:v>
@@ -2231,7 +2231,7 @@
                   <c:v>6.54166666666666</c:v>
                 </c:pt>
                 <c:pt idx="80" formatCode="General">
-                  <c:v>6.624999999999999</c:v>
+                  <c:v>6.624999999999997</c:v>
                 </c:pt>
                 <c:pt idx="81" formatCode="General">
                   <c:v>6.70833333333333</c:v>
@@ -2249,7 +2249,7 @@
                   <c:v>7.04166666666666</c:v>
                 </c:pt>
                 <c:pt idx="86" formatCode="General">
-                  <c:v>7.124999999999999</c:v>
+                  <c:v>7.124999999999997</c:v>
                 </c:pt>
                 <c:pt idx="87" formatCode="General">
                   <c:v>7.20833333333333</c:v>
@@ -2267,7 +2267,7 @@
                   <c:v>7.54166666666666</c:v>
                 </c:pt>
                 <c:pt idx="92" formatCode="General">
-                  <c:v>7.624999999999999</c:v>
+                  <c:v>7.624999999999997</c:v>
                 </c:pt>
                 <c:pt idx="93" formatCode="General">
                   <c:v>7.70833333333333</c:v>
@@ -2288,7 +2288,7 @@
                   <c:v>8.125</c:v>
                 </c:pt>
                 <c:pt idx="99" formatCode="General">
-                  <c:v>8.208333333333329</c:v>
+                  <c:v>8.208333333333327</c:v>
                 </c:pt>
                 <c:pt idx="100" formatCode="General">
                   <c:v>8.29166666666666</c:v>
@@ -2306,7 +2306,7 @@
                   <c:v>8.625</c:v>
                 </c:pt>
                 <c:pt idx="105" formatCode="General">
-                  <c:v>8.708333333333329</c:v>
+                  <c:v>8.708333333333327</c:v>
                 </c:pt>
                 <c:pt idx="106" formatCode="General">
                   <c:v>8.79166666666666</c:v>
@@ -2324,7 +2324,7 @@
                   <c:v>9.125</c:v>
                 </c:pt>
                 <c:pt idx="111" formatCode="General">
-                  <c:v>9.208333333333329</c:v>
+                  <c:v>9.208333333333327</c:v>
                 </c:pt>
                 <c:pt idx="112" formatCode="General">
                   <c:v>9.29166666666666</c:v>
@@ -2342,7 +2342,7 @@
                   <c:v>9.625</c:v>
                 </c:pt>
                 <c:pt idx="117" formatCode="General">
-                  <c:v>9.708333333333329</c:v>
+                  <c:v>9.708333333333327</c:v>
                 </c:pt>
                 <c:pt idx="118" formatCode="General">
                   <c:v>9.79166666666666</c:v>
@@ -2537,10 +2537,10 @@
                   <c:v>3.45873471251865</c:v>
                 </c:pt>
                 <c:pt idx="34">
-                  <c:v>4.269981759038809</c:v>
+                  <c:v>4.269981759038808</c:v>
                 </c:pt>
                 <c:pt idx="35">
-                  <c:v>6.158138768266048</c:v>
+                  <c:v>6.158138768266046</c:v>
                 </c:pt>
                 <c:pt idx="36">
                   <c:v>2.99883391790022</c:v>
@@ -3056,7 +3056,7 @@
                   <c:v>4.04166666666666</c:v>
                 </c:pt>
                 <c:pt idx="50" formatCode="General">
-                  <c:v>4.124999999999999</c:v>
+                  <c:v>4.124999999999997</c:v>
                 </c:pt>
                 <c:pt idx="51" formatCode="General">
                   <c:v>4.20833333333333</c:v>
@@ -3074,7 +3074,7 @@
                   <c:v>4.54166666666666</c:v>
                 </c:pt>
                 <c:pt idx="56" formatCode="General">
-                  <c:v>4.624999999999999</c:v>
+                  <c:v>4.624999999999997</c:v>
                 </c:pt>
                 <c:pt idx="57" formatCode="General">
                   <c:v>4.70833333333333</c:v>
@@ -3092,7 +3092,7 @@
                   <c:v>5.04166666666666</c:v>
                 </c:pt>
                 <c:pt idx="62" formatCode="General">
-                  <c:v>5.124999999999999</c:v>
+                  <c:v>5.124999999999997</c:v>
                 </c:pt>
                 <c:pt idx="63" formatCode="General">
                   <c:v>5.20833333333333</c:v>
@@ -3110,7 +3110,7 @@
                   <c:v>5.54166666666666</c:v>
                 </c:pt>
                 <c:pt idx="68" formatCode="General">
-                  <c:v>5.624999999999999</c:v>
+                  <c:v>5.624999999999997</c:v>
                 </c:pt>
                 <c:pt idx="69" formatCode="General">
                   <c:v>5.70833333333333</c:v>
@@ -3128,7 +3128,7 @@
                   <c:v>6.04166666666666</c:v>
                 </c:pt>
                 <c:pt idx="74" formatCode="General">
-                  <c:v>6.124999999999999</c:v>
+                  <c:v>6.124999999999997</c:v>
                 </c:pt>
                 <c:pt idx="75" formatCode="General">
                   <c:v>6.20833333333333</c:v>
@@ -3146,7 +3146,7 @@
                   <c:v>6.54166666666666</c:v>
                 </c:pt>
                 <c:pt idx="80" formatCode="General">
-                  <c:v>6.624999999999999</c:v>
+                  <c:v>6.624999999999997</c:v>
                 </c:pt>
                 <c:pt idx="81" formatCode="General">
                   <c:v>6.70833333333333</c:v>
@@ -3164,7 +3164,7 @@
                   <c:v>7.04166666666666</c:v>
                 </c:pt>
                 <c:pt idx="86" formatCode="General">
-                  <c:v>7.124999999999999</c:v>
+                  <c:v>7.124999999999997</c:v>
                 </c:pt>
                 <c:pt idx="87" formatCode="General">
                   <c:v>7.20833333333333</c:v>
@@ -3182,7 +3182,7 @@
                   <c:v>7.54166666666666</c:v>
                 </c:pt>
                 <c:pt idx="92" formatCode="General">
-                  <c:v>7.624999999999999</c:v>
+                  <c:v>7.624999999999997</c:v>
                 </c:pt>
                 <c:pt idx="93" formatCode="General">
                   <c:v>7.70833333333333</c:v>
@@ -3203,7 +3203,7 @@
                   <c:v>8.125</c:v>
                 </c:pt>
                 <c:pt idx="99" formatCode="General">
-                  <c:v>8.208333333333329</c:v>
+                  <c:v>8.208333333333327</c:v>
                 </c:pt>
                 <c:pt idx="100" formatCode="General">
                   <c:v>8.29166666666666</c:v>
@@ -3221,7 +3221,7 @@
                   <c:v>8.625</c:v>
                 </c:pt>
                 <c:pt idx="105" formatCode="General">
-                  <c:v>8.708333333333329</c:v>
+                  <c:v>8.708333333333327</c:v>
                 </c:pt>
                 <c:pt idx="106" formatCode="General">
                   <c:v>8.79166666666666</c:v>
@@ -3239,7 +3239,7 @@
                   <c:v>9.125</c:v>
                 </c:pt>
                 <c:pt idx="111" formatCode="General">
-                  <c:v>9.208333333333329</c:v>
+                  <c:v>9.208333333333327</c:v>
                 </c:pt>
                 <c:pt idx="112" formatCode="General">
                   <c:v>9.29166666666666</c:v>
@@ -3257,7 +3257,7 @@
                   <c:v>9.625</c:v>
                 </c:pt>
                 <c:pt idx="117" formatCode="General">
-                  <c:v>9.708333333333329</c:v>
+                  <c:v>9.708333333333327</c:v>
                 </c:pt>
                 <c:pt idx="118" formatCode="General">
                   <c:v>9.79166666666666</c:v>
@@ -3413,16 +3413,16 @@
                   <c:v>0.771482903693086</c:v>
                 </c:pt>
                 <c:pt idx="21">
-                  <c:v>2.818079703693219</c:v>
+                  <c:v>2.818079703693218</c:v>
                 </c:pt>
                 <c:pt idx="22">
                   <c:v>0.953917361095819</c:v>
                 </c:pt>
                 <c:pt idx="23">
-                  <c:v>2.295852879303639</c:v>
+                  <c:v>2.295852879303638</c:v>
                 </c:pt>
                 <c:pt idx="24">
-                  <c:v>2.156868523184749</c:v>
+                  <c:v>2.156868523184748</c:v>
                 </c:pt>
                 <c:pt idx="25">
                   <c:v>0.691094935878203</c:v>
@@ -4060,13 +4060,13 @@
                   <c:v>3.975</c:v>
                 </c:pt>
                 <c:pt idx="80">
-                  <c:v>4.024999999999999</c:v>
+                  <c:v>4.024999999999998</c:v>
                 </c:pt>
                 <c:pt idx="81">
                   <c:v>4.075</c:v>
                 </c:pt>
                 <c:pt idx="82">
-                  <c:v>4.124999999999999</c:v>
+                  <c:v>4.124999999999997</c:v>
                 </c:pt>
                 <c:pt idx="83">
                   <c:v>4.175</c:v>
@@ -4078,7 +4078,7 @@
                   <c:v>4.275</c:v>
                 </c:pt>
                 <c:pt idx="86">
-                  <c:v>4.324999999999999</c:v>
+                  <c:v>4.324999999999997</c:v>
                 </c:pt>
                 <c:pt idx="87">
                   <c:v>4.375</c:v>
@@ -4090,13 +4090,13 @@
                   <c:v>4.475</c:v>
                 </c:pt>
                 <c:pt idx="90">
-                  <c:v>4.524999999999999</c:v>
+                  <c:v>4.524999999999998</c:v>
                 </c:pt>
                 <c:pt idx="91">
                   <c:v>4.575</c:v>
                 </c:pt>
                 <c:pt idx="92">
-                  <c:v>4.624999999999999</c:v>
+                  <c:v>4.624999999999997</c:v>
                 </c:pt>
                 <c:pt idx="93">
                   <c:v>4.675</c:v>
@@ -4108,7 +4108,7 @@
                   <c:v>4.775</c:v>
                 </c:pt>
                 <c:pt idx="96">
-                  <c:v>4.824999999999999</c:v>
+                  <c:v>4.824999999999997</c:v>
                 </c:pt>
                 <c:pt idx="97">
                   <c:v>4.875</c:v>
@@ -4120,13 +4120,13 @@
                   <c:v>4.975</c:v>
                 </c:pt>
                 <c:pt idx="100">
-                  <c:v>5.024999999999999</c:v>
+                  <c:v>5.024999999999998</c:v>
                 </c:pt>
                 <c:pt idx="101">
                   <c:v>5.075</c:v>
                 </c:pt>
                 <c:pt idx="102">
-                  <c:v>5.124999999999999</c:v>
+                  <c:v>5.124999999999997</c:v>
                 </c:pt>
                 <c:pt idx="103">
                   <c:v>5.175</c:v>
@@ -4138,7 +4138,7 @@
                   <c:v>5.275</c:v>
                 </c:pt>
                 <c:pt idx="106">
-                  <c:v>5.324999999999999</c:v>
+                  <c:v>5.324999999999997</c:v>
                 </c:pt>
                 <c:pt idx="107">
                   <c:v>5.375</c:v>
@@ -4150,13 +4150,13 @@
                   <c:v>5.475</c:v>
                 </c:pt>
                 <c:pt idx="110">
-                  <c:v>5.524999999999999</c:v>
+                  <c:v>5.524999999999998</c:v>
                 </c:pt>
                 <c:pt idx="111">
                   <c:v>5.575</c:v>
                 </c:pt>
                 <c:pt idx="112">
-                  <c:v>5.624999999999999</c:v>
+                  <c:v>5.624999999999997</c:v>
                 </c:pt>
                 <c:pt idx="113">
                   <c:v>5.675</c:v>
@@ -4168,7 +4168,7 @@
                   <c:v>5.775</c:v>
                 </c:pt>
                 <c:pt idx="116">
-                  <c:v>5.824999999999999</c:v>
+                  <c:v>5.824999999999997</c:v>
                 </c:pt>
                 <c:pt idx="117">
                   <c:v>5.875</c:v>
@@ -4180,13 +4180,13 @@
                   <c:v>5.975</c:v>
                 </c:pt>
                 <c:pt idx="120">
-                  <c:v>6.024999999999999</c:v>
+                  <c:v>6.024999999999998</c:v>
                 </c:pt>
                 <c:pt idx="121">
                   <c:v>6.075</c:v>
                 </c:pt>
                 <c:pt idx="122">
-                  <c:v>6.124999999999999</c:v>
+                  <c:v>6.124999999999997</c:v>
                 </c:pt>
                 <c:pt idx="123">
                   <c:v>6.175</c:v>
@@ -4198,7 +4198,7 @@
                   <c:v>6.275</c:v>
                 </c:pt>
                 <c:pt idx="126">
-                  <c:v>6.324999999999999</c:v>
+                  <c:v>6.324999999999997</c:v>
                 </c:pt>
                 <c:pt idx="127">
                   <c:v>6.375</c:v>
@@ -4210,13 +4210,13 @@
                   <c:v>6.475</c:v>
                 </c:pt>
                 <c:pt idx="130">
-                  <c:v>6.524999999999999</c:v>
+                  <c:v>6.524999999999998</c:v>
                 </c:pt>
                 <c:pt idx="131">
                   <c:v>6.575</c:v>
                 </c:pt>
                 <c:pt idx="132">
-                  <c:v>6.624999999999999</c:v>
+                  <c:v>6.624999999999997</c:v>
                 </c:pt>
                 <c:pt idx="133">
                   <c:v>6.675</c:v>
@@ -4228,7 +4228,7 @@
                   <c:v>6.775</c:v>
                 </c:pt>
                 <c:pt idx="136">
-                  <c:v>6.824999999999999</c:v>
+                  <c:v>6.824999999999997</c:v>
                 </c:pt>
                 <c:pt idx="137">
                   <c:v>6.875</c:v>
@@ -4240,13 +4240,13 @@
                   <c:v>6.975</c:v>
                 </c:pt>
                 <c:pt idx="140">
-                  <c:v>7.024999999999999</c:v>
+                  <c:v>7.024999999999998</c:v>
                 </c:pt>
                 <c:pt idx="141">
                   <c:v>7.075</c:v>
                 </c:pt>
                 <c:pt idx="142">
-                  <c:v>7.124999999999999</c:v>
+                  <c:v>7.124999999999997</c:v>
                 </c:pt>
                 <c:pt idx="143">
                   <c:v>7.175</c:v>
@@ -4258,7 +4258,7 @@
                   <c:v>7.275</c:v>
                 </c:pt>
                 <c:pt idx="146">
-                  <c:v>7.324999999999999</c:v>
+                  <c:v>7.324999999999997</c:v>
                 </c:pt>
                 <c:pt idx="147">
                   <c:v>7.375</c:v>
@@ -4270,13 +4270,13 @@
                   <c:v>7.475</c:v>
                 </c:pt>
                 <c:pt idx="150">
-                  <c:v>7.524999999999999</c:v>
+                  <c:v>7.524999999999998</c:v>
                 </c:pt>
                 <c:pt idx="151">
                   <c:v>7.575</c:v>
                 </c:pt>
                 <c:pt idx="152">
-                  <c:v>7.624999999999999</c:v>
+                  <c:v>7.624999999999997</c:v>
                 </c:pt>
                 <c:pt idx="153">
                   <c:v>7.675</c:v>
@@ -4288,7 +4288,7 @@
                   <c:v>7.775</c:v>
                 </c:pt>
                 <c:pt idx="156">
-                  <c:v>7.824999999999999</c:v>
+                  <c:v>7.824999999999997</c:v>
                 </c:pt>
                 <c:pt idx="157">
                   <c:v>7.875</c:v>
@@ -5467,7 +5467,7 @@
                   <c:v>3.010055299999999</c:v>
                 </c:pt>
                 <c:pt idx="55">
-                  <c:v>2.992850299999999</c:v>
+                  <c:v>2.992850299999998</c:v>
                 </c:pt>
                 <c:pt idx="56">
                   <c:v>2.6678936</c:v>
@@ -7050,13 +7050,13 @@
                   <c:v>3.975</c:v>
                 </c:pt>
                 <c:pt idx="80">
-                  <c:v>4.024999999999999</c:v>
+                  <c:v>4.024999999999998</c:v>
                 </c:pt>
                 <c:pt idx="81">
                   <c:v>4.075</c:v>
                 </c:pt>
                 <c:pt idx="82">
-                  <c:v>4.124999999999999</c:v>
+                  <c:v>4.124999999999997</c:v>
                 </c:pt>
                 <c:pt idx="83">
                   <c:v>4.175</c:v>
@@ -7068,7 +7068,7 @@
                   <c:v>4.275</c:v>
                 </c:pt>
                 <c:pt idx="86">
-                  <c:v>4.324999999999999</c:v>
+                  <c:v>4.324999999999997</c:v>
                 </c:pt>
                 <c:pt idx="87">
                   <c:v>4.375</c:v>
@@ -7080,13 +7080,13 @@
                   <c:v>4.475</c:v>
                 </c:pt>
                 <c:pt idx="90">
-                  <c:v>4.524999999999999</c:v>
+                  <c:v>4.524999999999998</c:v>
                 </c:pt>
                 <c:pt idx="91">
                   <c:v>4.575</c:v>
                 </c:pt>
                 <c:pt idx="92">
-                  <c:v>4.624999999999999</c:v>
+                  <c:v>4.624999999999997</c:v>
                 </c:pt>
                 <c:pt idx="93">
                   <c:v>4.675</c:v>
@@ -7098,7 +7098,7 @@
                   <c:v>4.775</c:v>
                 </c:pt>
                 <c:pt idx="96">
-                  <c:v>4.824999999999999</c:v>
+                  <c:v>4.824999999999997</c:v>
                 </c:pt>
                 <c:pt idx="97">
                   <c:v>4.875</c:v>
@@ -7110,13 +7110,13 @@
                   <c:v>4.975</c:v>
                 </c:pt>
                 <c:pt idx="100">
-                  <c:v>5.024999999999999</c:v>
+                  <c:v>5.024999999999998</c:v>
                 </c:pt>
                 <c:pt idx="101">
                   <c:v>5.075</c:v>
                 </c:pt>
                 <c:pt idx="102">
-                  <c:v>5.124999999999999</c:v>
+                  <c:v>5.124999999999997</c:v>
                 </c:pt>
                 <c:pt idx="103">
                   <c:v>5.175</c:v>
@@ -7128,7 +7128,7 @@
                   <c:v>5.275</c:v>
                 </c:pt>
                 <c:pt idx="106">
-                  <c:v>5.324999999999999</c:v>
+                  <c:v>5.324999999999997</c:v>
                 </c:pt>
                 <c:pt idx="107">
                   <c:v>5.375</c:v>
@@ -7140,13 +7140,13 @@
                   <c:v>5.475</c:v>
                 </c:pt>
                 <c:pt idx="110">
-                  <c:v>5.524999999999999</c:v>
+                  <c:v>5.524999999999998</c:v>
                 </c:pt>
                 <c:pt idx="111">
                   <c:v>5.575</c:v>
                 </c:pt>
                 <c:pt idx="112">
-                  <c:v>5.624999999999999</c:v>
+                  <c:v>5.624999999999997</c:v>
                 </c:pt>
                 <c:pt idx="113">
                   <c:v>5.675</c:v>
@@ -7158,7 +7158,7 @@
                   <c:v>5.775</c:v>
                 </c:pt>
                 <c:pt idx="116">
-                  <c:v>5.824999999999999</c:v>
+                  <c:v>5.824999999999997</c:v>
                 </c:pt>
                 <c:pt idx="117">
                   <c:v>5.875</c:v>
@@ -7170,13 +7170,13 @@
                   <c:v>5.975</c:v>
                 </c:pt>
                 <c:pt idx="120">
-                  <c:v>6.024999999999999</c:v>
+                  <c:v>6.024999999999998</c:v>
                 </c:pt>
                 <c:pt idx="121">
                   <c:v>6.075</c:v>
                 </c:pt>
                 <c:pt idx="122">
-                  <c:v>6.124999999999999</c:v>
+                  <c:v>6.124999999999997</c:v>
                 </c:pt>
                 <c:pt idx="123">
                   <c:v>6.175</c:v>
@@ -7188,7 +7188,7 @@
                   <c:v>6.275</c:v>
                 </c:pt>
                 <c:pt idx="126">
-                  <c:v>6.324999999999999</c:v>
+                  <c:v>6.324999999999997</c:v>
                 </c:pt>
                 <c:pt idx="127">
                   <c:v>6.375</c:v>
@@ -7200,13 +7200,13 @@
                   <c:v>6.475</c:v>
                 </c:pt>
                 <c:pt idx="130">
-                  <c:v>6.524999999999999</c:v>
+                  <c:v>6.524999999999998</c:v>
                 </c:pt>
                 <c:pt idx="131">
                   <c:v>6.575</c:v>
                 </c:pt>
                 <c:pt idx="132">
-                  <c:v>6.624999999999999</c:v>
+                  <c:v>6.624999999999997</c:v>
                 </c:pt>
                 <c:pt idx="133">
                   <c:v>6.675</c:v>
@@ -7218,7 +7218,7 @@
                   <c:v>6.775</c:v>
                 </c:pt>
                 <c:pt idx="136">
-                  <c:v>6.824999999999999</c:v>
+                  <c:v>6.824999999999997</c:v>
                 </c:pt>
                 <c:pt idx="137">
                   <c:v>6.875</c:v>
@@ -7230,13 +7230,13 @@
                   <c:v>6.975</c:v>
                 </c:pt>
                 <c:pt idx="140">
-                  <c:v>7.024999999999999</c:v>
+                  <c:v>7.024999999999998</c:v>
                 </c:pt>
                 <c:pt idx="141">
                   <c:v>7.075</c:v>
                 </c:pt>
                 <c:pt idx="142">
-                  <c:v>7.124999999999999</c:v>
+                  <c:v>7.124999999999997</c:v>
                 </c:pt>
                 <c:pt idx="143">
                   <c:v>7.175</c:v>
@@ -7248,7 +7248,7 @@
                   <c:v>7.275</c:v>
                 </c:pt>
                 <c:pt idx="146">
-                  <c:v>7.324999999999999</c:v>
+                  <c:v>7.324999999999997</c:v>
                 </c:pt>
                 <c:pt idx="147">
                   <c:v>7.375</c:v>
@@ -7260,13 +7260,13 @@
                   <c:v>7.475</c:v>
                 </c:pt>
                 <c:pt idx="150">
-                  <c:v>7.524999999999999</c:v>
+                  <c:v>7.524999999999998</c:v>
                 </c:pt>
                 <c:pt idx="151">
                   <c:v>7.575</c:v>
                 </c:pt>
                 <c:pt idx="152">
-                  <c:v>7.624999999999999</c:v>
+                  <c:v>7.624999999999997</c:v>
                 </c:pt>
                 <c:pt idx="153">
                   <c:v>7.675</c:v>
@@ -7278,7 +7278,7 @@
                   <c:v>7.775</c:v>
                 </c:pt>
                 <c:pt idx="156">
-                  <c:v>7.824999999999999</c:v>
+                  <c:v>7.824999999999997</c:v>
                 </c:pt>
                 <c:pt idx="157">
                   <c:v>7.875</c:v>
@@ -9777,11 +9777,11 @@
           <c:showPercent val="0"/>
           <c:showBubbleSize val="0"/>
         </c:dLbls>
-        <c:axId val="-2114824776"/>
-        <c:axId val="-2114804968"/>
+        <c:axId val="-2146386040"/>
+        <c:axId val="-2146392184"/>
       </c:scatterChart>
       <c:valAx>
-        <c:axId val="-2114824776"/>
+        <c:axId val="-2146386040"/>
         <c:scaling>
           <c:orientation val="minMax"/>
           <c:max val="10.0"/>
@@ -9834,12 +9834,12 @@
             <a:endParaRPr lang="zh-CN"/>
           </a:p>
         </c:txPr>
-        <c:crossAx val="-2114804968"/>
+        <c:crossAx val="-2146392184"/>
         <c:crosses val="autoZero"/>
         <c:crossBetween val="midCat"/>
       </c:valAx>
       <c:valAx>
-        <c:axId val="-2114804968"/>
+        <c:axId val="-2146392184"/>
         <c:scaling>
           <c:orientation val="minMax"/>
           <c:max val="4.0"/>
@@ -9868,7 +9868,7 @@
             <a:endParaRPr lang="zh-CN"/>
           </a:p>
         </c:txPr>
-        <c:crossAx val="-2114824776"/>
+        <c:crossAx val="-2146386040"/>
         <c:crosses val="autoZero"/>
         <c:crossBetween val="midCat"/>
       </c:valAx>
@@ -9942,7 +9942,7 @@
     <c:plotArea>
       <c:layout/>
       <c:scatterChart>
-        <c:scatterStyle val="smoothMarker"/>
+        <c:scatterStyle val="lineMarker"/>
         <c:varyColors val="0"/>
         <c:ser>
           <c:idx val="2"/>
@@ -10126,7 +10126,7 @@
                   <c:v>4.04166666666666</c:v>
                 </c:pt>
                 <c:pt idx="50" formatCode="General">
-                  <c:v>4.124999999999996</c:v>
+                  <c:v>4.124999999999995</c:v>
                 </c:pt>
                 <c:pt idx="51" formatCode="General">
                   <c:v>4.20833333333333</c:v>
@@ -10144,7 +10144,7 @@
                   <c:v>4.54166666666666</c:v>
                 </c:pt>
                 <c:pt idx="56" formatCode="General">
-                  <c:v>4.624999999999995</c:v>
+                  <c:v>4.624999999999994</c:v>
                 </c:pt>
                 <c:pt idx="57" formatCode="General">
                   <c:v>4.70833333333333</c:v>
@@ -10162,7 +10162,7 @@
                   <c:v>5.04166666666666</c:v>
                 </c:pt>
                 <c:pt idx="62" formatCode="General">
-                  <c:v>5.124999999999996</c:v>
+                  <c:v>5.124999999999995</c:v>
                 </c:pt>
                 <c:pt idx="63" formatCode="General">
                   <c:v>5.20833333333333</c:v>
@@ -10180,7 +10180,7 @@
                   <c:v>5.54166666666666</c:v>
                 </c:pt>
                 <c:pt idx="68" formatCode="General">
-                  <c:v>5.624999999999995</c:v>
+                  <c:v>5.624999999999994</c:v>
                 </c:pt>
                 <c:pt idx="69" formatCode="General">
                   <c:v>5.70833333333333</c:v>
@@ -10198,7 +10198,7 @@
                   <c:v>6.04166666666666</c:v>
                 </c:pt>
                 <c:pt idx="74" formatCode="General">
-                  <c:v>6.124999999999996</c:v>
+                  <c:v>6.124999999999995</c:v>
                 </c:pt>
                 <c:pt idx="75" formatCode="General">
                   <c:v>6.20833333333333</c:v>
@@ -10216,7 +10216,7 @@
                   <c:v>6.54166666666666</c:v>
                 </c:pt>
                 <c:pt idx="80" formatCode="General">
-                  <c:v>6.624999999999995</c:v>
+                  <c:v>6.624999999999994</c:v>
                 </c:pt>
                 <c:pt idx="81" formatCode="General">
                   <c:v>6.70833333333333</c:v>
@@ -10234,7 +10234,7 @@
                   <c:v>7.04166666666666</c:v>
                 </c:pt>
                 <c:pt idx="86" formatCode="General">
-                  <c:v>7.124999999999996</c:v>
+                  <c:v>7.124999999999995</c:v>
                 </c:pt>
                 <c:pt idx="87" formatCode="General">
                   <c:v>7.20833333333333</c:v>
@@ -10252,7 +10252,7 @@
                   <c:v>7.54166666666666</c:v>
                 </c:pt>
                 <c:pt idx="92" formatCode="General">
-                  <c:v>7.624999999999995</c:v>
+                  <c:v>7.624999999999994</c:v>
                 </c:pt>
                 <c:pt idx="93" formatCode="General">
                   <c:v>7.70833333333333</c:v>
@@ -10273,7 +10273,7 @@
                   <c:v>8.125</c:v>
                 </c:pt>
                 <c:pt idx="99" formatCode="General">
-                  <c:v>8.208333333333325</c:v>
+                  <c:v>8.208333333333323</c:v>
                 </c:pt>
                 <c:pt idx="100" formatCode="General">
                   <c:v>8.29166666666666</c:v>
@@ -10291,7 +10291,7 @@
                   <c:v>8.625</c:v>
                 </c:pt>
                 <c:pt idx="105" formatCode="General">
-                  <c:v>8.708333333333325</c:v>
+                  <c:v>8.708333333333323</c:v>
                 </c:pt>
                 <c:pt idx="106" formatCode="General">
                   <c:v>8.79166666666666</c:v>
@@ -10309,7 +10309,7 @@
                   <c:v>9.125</c:v>
                 </c:pt>
                 <c:pt idx="111" formatCode="General">
-                  <c:v>9.208333333333325</c:v>
+                  <c:v>9.208333333333323</c:v>
                 </c:pt>
                 <c:pt idx="112" formatCode="General">
                   <c:v>9.29166666666666</c:v>
@@ -10327,7 +10327,7 @@
                   <c:v>9.625</c:v>
                 </c:pt>
                 <c:pt idx="117" formatCode="General">
-                  <c:v>9.708333333333325</c:v>
+                  <c:v>9.708333333333323</c:v>
                 </c:pt>
                 <c:pt idx="118" formatCode="General">
                   <c:v>9.79166666666666</c:v>
@@ -10771,7 +10771,7 @@
                   <c:v>1.0066010924308</c:v>
                 </c:pt>
                 <c:pt idx="117">
-                  <c:v>1.007929302489167</c:v>
+                  <c:v>1.007929302489166</c:v>
                 </c:pt>
                 <c:pt idx="118">
                   <c:v>1.0079852754794</c:v>
@@ -10857,7 +10857,7 @@
               </c:numCache>
             </c:numRef>
           </c:yVal>
-          <c:smooth val="1"/>
+          <c:smooth val="0"/>
         </c:ser>
         <c:ser>
           <c:idx val="4"/>
@@ -11043,7 +11043,7 @@
                   <c:v>4.04166666666666</c:v>
                 </c:pt>
                 <c:pt idx="50" formatCode="General">
-                  <c:v>4.124999999999996</c:v>
+                  <c:v>4.124999999999995</c:v>
                 </c:pt>
                 <c:pt idx="51" formatCode="General">
                   <c:v>4.20833333333333</c:v>
@@ -11061,7 +11061,7 @@
                   <c:v>4.54166666666666</c:v>
                 </c:pt>
                 <c:pt idx="56" formatCode="General">
-                  <c:v>4.624999999999995</c:v>
+                  <c:v>4.624999999999994</c:v>
                 </c:pt>
                 <c:pt idx="57" formatCode="General">
                   <c:v>4.70833333333333</c:v>
@@ -11079,7 +11079,7 @@
                   <c:v>5.04166666666666</c:v>
                 </c:pt>
                 <c:pt idx="62" formatCode="General">
-                  <c:v>5.124999999999996</c:v>
+                  <c:v>5.124999999999995</c:v>
                 </c:pt>
                 <c:pt idx="63" formatCode="General">
                   <c:v>5.20833333333333</c:v>
@@ -11097,7 +11097,7 @@
                   <c:v>5.54166666666666</c:v>
                 </c:pt>
                 <c:pt idx="68" formatCode="General">
-                  <c:v>5.624999999999995</c:v>
+                  <c:v>5.624999999999994</c:v>
                 </c:pt>
                 <c:pt idx="69" formatCode="General">
                   <c:v>5.70833333333333</c:v>
@@ -11115,7 +11115,7 @@
                   <c:v>6.04166666666666</c:v>
                 </c:pt>
                 <c:pt idx="74" formatCode="General">
-                  <c:v>6.124999999999996</c:v>
+                  <c:v>6.124999999999995</c:v>
                 </c:pt>
                 <c:pt idx="75" formatCode="General">
                   <c:v>6.20833333333333</c:v>
@@ -11133,7 +11133,7 @@
                   <c:v>6.54166666666666</c:v>
                 </c:pt>
                 <c:pt idx="80" formatCode="General">
-                  <c:v>6.624999999999995</c:v>
+                  <c:v>6.624999999999994</c:v>
                 </c:pt>
                 <c:pt idx="81" formatCode="General">
                   <c:v>6.70833333333333</c:v>
@@ -11151,7 +11151,7 @@
                   <c:v>7.04166666666666</c:v>
                 </c:pt>
                 <c:pt idx="86" formatCode="General">
-                  <c:v>7.124999999999996</c:v>
+                  <c:v>7.124999999999995</c:v>
                 </c:pt>
                 <c:pt idx="87" formatCode="General">
                   <c:v>7.20833333333333</c:v>
@@ -11169,7 +11169,7 @@
                   <c:v>7.54166666666666</c:v>
                 </c:pt>
                 <c:pt idx="92" formatCode="General">
-                  <c:v>7.624999999999995</c:v>
+                  <c:v>7.624999999999994</c:v>
                 </c:pt>
                 <c:pt idx="93" formatCode="General">
                   <c:v>7.70833333333333</c:v>
@@ -11190,7 +11190,7 @@
                   <c:v>8.125</c:v>
                 </c:pt>
                 <c:pt idx="99" formatCode="General">
-                  <c:v>8.208333333333325</c:v>
+                  <c:v>8.208333333333323</c:v>
                 </c:pt>
                 <c:pt idx="100" formatCode="General">
                   <c:v>8.29166666666666</c:v>
@@ -11208,7 +11208,7 @@
                   <c:v>8.625</c:v>
                 </c:pt>
                 <c:pt idx="105" formatCode="General">
-                  <c:v>8.708333333333325</c:v>
+                  <c:v>8.708333333333323</c:v>
                 </c:pt>
                 <c:pt idx="106" formatCode="General">
                   <c:v>8.79166666666666</c:v>
@@ -11226,7 +11226,7 @@
                   <c:v>9.125</c:v>
                 </c:pt>
                 <c:pt idx="111" formatCode="General">
-                  <c:v>9.208333333333325</c:v>
+                  <c:v>9.208333333333323</c:v>
                 </c:pt>
                 <c:pt idx="112" formatCode="General">
                   <c:v>9.29166666666666</c:v>
@@ -11244,7 +11244,7 @@
                   <c:v>9.625</c:v>
                 </c:pt>
                 <c:pt idx="117" formatCode="General">
-                  <c:v>9.708333333333325</c:v>
+                  <c:v>9.708333333333323</c:v>
                 </c:pt>
                 <c:pt idx="118" formatCode="General">
                   <c:v>9.79166666666666</c:v>
@@ -11439,10 +11439,10 @@
                   <c:v>3.45873471251865</c:v>
                 </c:pt>
                 <c:pt idx="34">
-                  <c:v>4.269981759038807</c:v>
+                  <c:v>4.269981759038806</c:v>
                 </c:pt>
                 <c:pt idx="35">
-                  <c:v>6.158138768266045</c:v>
+                  <c:v>6.158138768266044</c:v>
                 </c:pt>
                 <c:pt idx="36">
                   <c:v>2.99883391790022</c:v>
@@ -11774,7 +11774,7 @@
               </c:numCache>
             </c:numRef>
           </c:yVal>
-          <c:smooth val="1"/>
+          <c:smooth val="0"/>
         </c:ser>
         <c:ser>
           <c:idx val="0"/>
@@ -12047,13 +12047,13 @@
                   <c:v>3.975</c:v>
                 </c:pt>
                 <c:pt idx="80">
-                  <c:v>4.024999999999997</c:v>
+                  <c:v>4.024999999999996</c:v>
                 </c:pt>
                 <c:pt idx="81">
                   <c:v>4.075</c:v>
                 </c:pt>
                 <c:pt idx="82">
-                  <c:v>4.124999999999996</c:v>
+                  <c:v>4.124999999999995</c:v>
                 </c:pt>
                 <c:pt idx="83">
                   <c:v>4.175</c:v>
@@ -12065,7 +12065,7 @@
                   <c:v>4.275</c:v>
                 </c:pt>
                 <c:pt idx="86">
-                  <c:v>4.324999999999996</c:v>
+                  <c:v>4.324999999999995</c:v>
                 </c:pt>
                 <c:pt idx="87">
                   <c:v>4.375</c:v>
@@ -12077,13 +12077,13 @@
                   <c:v>4.475</c:v>
                 </c:pt>
                 <c:pt idx="90">
-                  <c:v>4.524999999999997</c:v>
+                  <c:v>4.524999999999996</c:v>
                 </c:pt>
                 <c:pt idx="91">
                   <c:v>4.575</c:v>
                 </c:pt>
                 <c:pt idx="92">
-                  <c:v>4.624999999999995</c:v>
+                  <c:v>4.624999999999994</c:v>
                 </c:pt>
                 <c:pt idx="93">
                   <c:v>4.675</c:v>
@@ -12095,7 +12095,7 @@
                   <c:v>4.775</c:v>
                 </c:pt>
                 <c:pt idx="96">
-                  <c:v>4.824999999999996</c:v>
+                  <c:v>4.824999999999995</c:v>
                 </c:pt>
                 <c:pt idx="97">
                   <c:v>4.875</c:v>
@@ -12107,13 +12107,13 @@
                   <c:v>4.975</c:v>
                 </c:pt>
                 <c:pt idx="100">
-                  <c:v>5.024999999999997</c:v>
+                  <c:v>5.024999999999996</c:v>
                 </c:pt>
                 <c:pt idx="101">
                   <c:v>5.075</c:v>
                 </c:pt>
                 <c:pt idx="102">
-                  <c:v>5.124999999999996</c:v>
+                  <c:v>5.124999999999995</c:v>
                 </c:pt>
                 <c:pt idx="103">
                   <c:v>5.175</c:v>
@@ -12125,7 +12125,7 @@
                   <c:v>5.275</c:v>
                 </c:pt>
                 <c:pt idx="106">
-                  <c:v>5.324999999999996</c:v>
+                  <c:v>5.324999999999995</c:v>
                 </c:pt>
                 <c:pt idx="107">
                   <c:v>5.375</c:v>
@@ -12137,13 +12137,13 @@
                   <c:v>5.475</c:v>
                 </c:pt>
                 <c:pt idx="110">
-                  <c:v>5.524999999999997</c:v>
+                  <c:v>5.524999999999996</c:v>
                 </c:pt>
                 <c:pt idx="111">
                   <c:v>5.575</c:v>
                 </c:pt>
                 <c:pt idx="112">
-                  <c:v>5.624999999999995</c:v>
+                  <c:v>5.624999999999994</c:v>
                 </c:pt>
                 <c:pt idx="113">
                   <c:v>5.675</c:v>
@@ -12155,7 +12155,7 @@
                   <c:v>5.775</c:v>
                 </c:pt>
                 <c:pt idx="116">
-                  <c:v>5.824999999999996</c:v>
+                  <c:v>5.824999999999995</c:v>
                 </c:pt>
                 <c:pt idx="117">
                   <c:v>5.875</c:v>
@@ -12167,13 +12167,13 @@
                   <c:v>5.975</c:v>
                 </c:pt>
                 <c:pt idx="120">
-                  <c:v>6.024999999999997</c:v>
+                  <c:v>6.024999999999996</c:v>
                 </c:pt>
                 <c:pt idx="121">
                   <c:v>6.075</c:v>
                 </c:pt>
                 <c:pt idx="122">
-                  <c:v>6.124999999999996</c:v>
+                  <c:v>6.124999999999995</c:v>
                 </c:pt>
                 <c:pt idx="123">
                   <c:v>6.175</c:v>
@@ -12185,7 +12185,7 @@
                   <c:v>6.275</c:v>
                 </c:pt>
                 <c:pt idx="126">
-                  <c:v>6.324999999999996</c:v>
+                  <c:v>6.324999999999995</c:v>
                 </c:pt>
                 <c:pt idx="127">
                   <c:v>6.375</c:v>
@@ -12197,13 +12197,13 @@
                   <c:v>6.475</c:v>
                 </c:pt>
                 <c:pt idx="130">
-                  <c:v>6.524999999999997</c:v>
+                  <c:v>6.524999999999996</c:v>
                 </c:pt>
                 <c:pt idx="131">
                   <c:v>6.575</c:v>
                 </c:pt>
                 <c:pt idx="132">
-                  <c:v>6.624999999999995</c:v>
+                  <c:v>6.624999999999994</c:v>
                 </c:pt>
                 <c:pt idx="133">
                   <c:v>6.675</c:v>
@@ -12215,7 +12215,7 @@
                   <c:v>6.775</c:v>
                 </c:pt>
                 <c:pt idx="136">
-                  <c:v>6.824999999999996</c:v>
+                  <c:v>6.824999999999995</c:v>
                 </c:pt>
                 <c:pt idx="137">
                   <c:v>6.875</c:v>
@@ -12227,13 +12227,13 @@
                   <c:v>6.975</c:v>
                 </c:pt>
                 <c:pt idx="140">
-                  <c:v>7.024999999999997</c:v>
+                  <c:v>7.024999999999996</c:v>
                 </c:pt>
                 <c:pt idx="141">
                   <c:v>7.075</c:v>
                 </c:pt>
                 <c:pt idx="142">
-                  <c:v>7.124999999999996</c:v>
+                  <c:v>7.124999999999995</c:v>
                 </c:pt>
                 <c:pt idx="143">
                   <c:v>7.175</c:v>
@@ -12245,7 +12245,7 @@
                   <c:v>7.275</c:v>
                 </c:pt>
                 <c:pt idx="146">
-                  <c:v>7.324999999999996</c:v>
+                  <c:v>7.324999999999995</c:v>
                 </c:pt>
                 <c:pt idx="147">
                   <c:v>7.375</c:v>
@@ -12257,13 +12257,13 @@
                   <c:v>7.475</c:v>
                 </c:pt>
                 <c:pt idx="150">
-                  <c:v>7.524999999999997</c:v>
+                  <c:v>7.524999999999996</c:v>
                 </c:pt>
                 <c:pt idx="151">
                   <c:v>7.575</c:v>
                 </c:pt>
                 <c:pt idx="152">
-                  <c:v>7.624999999999995</c:v>
+                  <c:v>7.624999999999994</c:v>
                 </c:pt>
                 <c:pt idx="153">
                   <c:v>7.675</c:v>
@@ -12275,7 +12275,7 @@
                   <c:v>7.775</c:v>
                 </c:pt>
                 <c:pt idx="156">
-                  <c:v>7.824999999999996</c:v>
+                  <c:v>7.824999999999995</c:v>
                 </c:pt>
                 <c:pt idx="157">
                   <c:v>7.875</c:v>
@@ -14764,7 +14764,7 @@
               </c:numCache>
             </c:numRef>
           </c:yVal>
-          <c:smooth val="1"/>
+          <c:smooth val="0"/>
         </c:ser>
         <c:dLbls>
           <c:showLegendKey val="0"/>
@@ -14774,11 +14774,11 @@
           <c:showPercent val="0"/>
           <c:showBubbleSize val="0"/>
         </c:dLbls>
-        <c:axId val="2056586920"/>
-        <c:axId val="-2079504520"/>
+        <c:axId val="-2145071192"/>
+        <c:axId val="-2145065304"/>
       </c:scatterChart>
       <c:valAx>
-        <c:axId val="2056586920"/>
+        <c:axId val="-2145071192"/>
         <c:scaling>
           <c:orientation val="minMax"/>
           <c:max val="10.0"/>
@@ -14831,12 +14831,12 @@
             <a:endParaRPr lang="zh-CN"/>
           </a:p>
         </c:txPr>
-        <c:crossAx val="-2079504520"/>
+        <c:crossAx val="-2145065304"/>
         <c:crosses val="autoZero"/>
         <c:crossBetween val="midCat"/>
       </c:valAx>
       <c:valAx>
-        <c:axId val="-2079504520"/>
+        <c:axId val="-2145065304"/>
         <c:scaling>
           <c:orientation val="minMax"/>
           <c:max val="4.0"/>
@@ -14865,7 +14865,7 @@
             <a:endParaRPr lang="zh-CN"/>
           </a:p>
         </c:txPr>
-        <c:crossAx val="2056586920"/>
+        <c:crossAx val="-2145071192"/>
         <c:crosses val="autoZero"/>
         <c:crossBetween val="midCat"/>
       </c:valAx>
@@ -14924,7 +14924,7 @@
     <c:plotArea>
       <c:layout/>
       <c:scatterChart>
-        <c:scatterStyle val="smoothMarker"/>
+        <c:scatterStyle val="lineMarker"/>
         <c:varyColors val="0"/>
         <c:ser>
           <c:idx val="3"/>
@@ -15108,7 +15108,7 @@
                   <c:v>4.04166666666666</c:v>
                 </c:pt>
                 <c:pt idx="50" formatCode="General">
-                  <c:v>4.124999999999994</c:v>
+                  <c:v>4.124999999999993</c:v>
                 </c:pt>
                 <c:pt idx="51" formatCode="General">
                   <c:v>4.20833333333333</c:v>
@@ -15126,7 +15126,7 @@
                   <c:v>4.54166666666666</c:v>
                 </c:pt>
                 <c:pt idx="56" formatCode="General">
-                  <c:v>4.624999999999993</c:v>
+                  <c:v>4.624999999999991</c:v>
                 </c:pt>
                 <c:pt idx="57" formatCode="General">
                   <c:v>4.70833333333333</c:v>
@@ -15144,7 +15144,7 @@
                   <c:v>5.04166666666666</c:v>
                 </c:pt>
                 <c:pt idx="62" formatCode="General">
-                  <c:v>5.124999999999994</c:v>
+                  <c:v>5.124999999999993</c:v>
                 </c:pt>
                 <c:pt idx="63" formatCode="General">
                   <c:v>5.20833333333333</c:v>
@@ -15162,7 +15162,7 @@
                   <c:v>5.54166666666666</c:v>
                 </c:pt>
                 <c:pt idx="68" formatCode="General">
-                  <c:v>5.624999999999993</c:v>
+                  <c:v>5.624999999999991</c:v>
                 </c:pt>
                 <c:pt idx="69" formatCode="General">
                   <c:v>5.70833333333333</c:v>
@@ -15180,7 +15180,7 @@
                   <c:v>6.04166666666666</c:v>
                 </c:pt>
                 <c:pt idx="74" formatCode="General">
-                  <c:v>6.124999999999994</c:v>
+                  <c:v>6.124999999999993</c:v>
                 </c:pt>
                 <c:pt idx="75" formatCode="General">
                   <c:v>6.20833333333333</c:v>
@@ -15198,7 +15198,7 @@
                   <c:v>6.54166666666666</c:v>
                 </c:pt>
                 <c:pt idx="80" formatCode="General">
-                  <c:v>6.624999999999993</c:v>
+                  <c:v>6.624999999999991</c:v>
                 </c:pt>
                 <c:pt idx="81" formatCode="General">
                   <c:v>6.70833333333333</c:v>
@@ -15216,7 +15216,7 @@
                   <c:v>7.04166666666666</c:v>
                 </c:pt>
                 <c:pt idx="86" formatCode="General">
-                  <c:v>7.124999999999994</c:v>
+                  <c:v>7.124999999999993</c:v>
                 </c:pt>
                 <c:pt idx="87" formatCode="General">
                   <c:v>7.20833333333333</c:v>
@@ -15234,7 +15234,7 @@
                   <c:v>7.54166666666666</c:v>
                 </c:pt>
                 <c:pt idx="92" formatCode="General">
-                  <c:v>7.624999999999993</c:v>
+                  <c:v>7.624999999999991</c:v>
                 </c:pt>
                 <c:pt idx="93" formatCode="General">
                   <c:v>7.70833333333333</c:v>
@@ -15255,7 +15255,7 @@
                   <c:v>8.125</c:v>
                 </c:pt>
                 <c:pt idx="99" formatCode="General">
-                  <c:v>8.208333333333321</c:v>
+                  <c:v>8.20833333333332</c:v>
                 </c:pt>
                 <c:pt idx="100" formatCode="General">
                   <c:v>8.29166666666666</c:v>
@@ -15273,7 +15273,7 @@
                   <c:v>8.625</c:v>
                 </c:pt>
                 <c:pt idx="105" formatCode="General">
-                  <c:v>8.708333333333321</c:v>
+                  <c:v>8.70833333333332</c:v>
                 </c:pt>
                 <c:pt idx="106" formatCode="General">
                   <c:v>8.79166666666666</c:v>
@@ -15291,7 +15291,7 @@
                   <c:v>9.125</c:v>
                 </c:pt>
                 <c:pt idx="111" formatCode="General">
-                  <c:v>9.208333333333321</c:v>
+                  <c:v>9.20833333333332</c:v>
                 </c:pt>
                 <c:pt idx="112" formatCode="General">
                   <c:v>9.29166666666666</c:v>
@@ -15309,7 +15309,7 @@
                   <c:v>9.625</c:v>
                 </c:pt>
                 <c:pt idx="117" formatCode="General">
-                  <c:v>9.708333333333321</c:v>
+                  <c:v>9.70833333333332</c:v>
                 </c:pt>
                 <c:pt idx="118" formatCode="General">
                   <c:v>9.79166666666666</c:v>
@@ -15839,7 +15839,7 @@
               </c:numCache>
             </c:numRef>
           </c:yVal>
-          <c:smooth val="1"/>
+          <c:smooth val="0"/>
         </c:ser>
         <c:ser>
           <c:idx val="5"/>
@@ -16023,7 +16023,7 @@
                   <c:v>4.04166666666666</c:v>
                 </c:pt>
                 <c:pt idx="50" formatCode="General">
-                  <c:v>4.124999999999994</c:v>
+                  <c:v>4.124999999999993</c:v>
                 </c:pt>
                 <c:pt idx="51" formatCode="General">
                   <c:v>4.20833333333333</c:v>
@@ -16041,7 +16041,7 @@
                   <c:v>4.54166666666666</c:v>
                 </c:pt>
                 <c:pt idx="56" formatCode="General">
-                  <c:v>4.624999999999993</c:v>
+                  <c:v>4.624999999999991</c:v>
                 </c:pt>
                 <c:pt idx="57" formatCode="General">
                   <c:v>4.70833333333333</c:v>
@@ -16059,7 +16059,7 @@
                   <c:v>5.04166666666666</c:v>
                 </c:pt>
                 <c:pt idx="62" formatCode="General">
-                  <c:v>5.124999999999994</c:v>
+                  <c:v>5.124999999999993</c:v>
                 </c:pt>
                 <c:pt idx="63" formatCode="General">
                   <c:v>5.20833333333333</c:v>
@@ -16077,7 +16077,7 @@
                   <c:v>5.54166666666666</c:v>
                 </c:pt>
                 <c:pt idx="68" formatCode="General">
-                  <c:v>5.624999999999993</c:v>
+                  <c:v>5.624999999999991</c:v>
                 </c:pt>
                 <c:pt idx="69" formatCode="General">
                   <c:v>5.70833333333333</c:v>
@@ -16095,7 +16095,7 @@
                   <c:v>6.04166666666666</c:v>
                 </c:pt>
                 <c:pt idx="74" formatCode="General">
-                  <c:v>6.124999999999994</c:v>
+                  <c:v>6.124999999999993</c:v>
                 </c:pt>
                 <c:pt idx="75" formatCode="General">
                   <c:v>6.20833333333333</c:v>
@@ -16113,7 +16113,7 @@
                   <c:v>6.54166666666666</c:v>
                 </c:pt>
                 <c:pt idx="80" formatCode="General">
-                  <c:v>6.624999999999993</c:v>
+                  <c:v>6.624999999999991</c:v>
                 </c:pt>
                 <c:pt idx="81" formatCode="General">
                   <c:v>6.70833333333333</c:v>
@@ -16131,7 +16131,7 @@
                   <c:v>7.04166666666666</c:v>
                 </c:pt>
                 <c:pt idx="86" formatCode="General">
-                  <c:v>7.124999999999994</c:v>
+                  <c:v>7.124999999999993</c:v>
                 </c:pt>
                 <c:pt idx="87" formatCode="General">
                   <c:v>7.20833333333333</c:v>
@@ -16149,7 +16149,7 @@
                   <c:v>7.54166666666666</c:v>
                 </c:pt>
                 <c:pt idx="92" formatCode="General">
-                  <c:v>7.624999999999993</c:v>
+                  <c:v>7.624999999999991</c:v>
                 </c:pt>
                 <c:pt idx="93" formatCode="General">
                   <c:v>7.70833333333333</c:v>
@@ -16170,7 +16170,7 @@
                   <c:v>8.125</c:v>
                 </c:pt>
                 <c:pt idx="99" formatCode="General">
-                  <c:v>8.208333333333321</c:v>
+                  <c:v>8.20833333333332</c:v>
                 </c:pt>
                 <c:pt idx="100" formatCode="General">
                   <c:v>8.29166666666666</c:v>
@@ -16188,7 +16188,7 @@
                   <c:v>8.625</c:v>
                 </c:pt>
                 <c:pt idx="105" formatCode="General">
-                  <c:v>8.708333333333321</c:v>
+                  <c:v>8.70833333333332</c:v>
                 </c:pt>
                 <c:pt idx="106" formatCode="General">
                   <c:v>8.79166666666666</c:v>
@@ -16206,7 +16206,7 @@
                   <c:v>9.125</c:v>
                 </c:pt>
                 <c:pt idx="111" formatCode="General">
-                  <c:v>9.208333333333321</c:v>
+                  <c:v>9.20833333333332</c:v>
                 </c:pt>
                 <c:pt idx="112" formatCode="General">
                   <c:v>9.29166666666666</c:v>
@@ -16224,7 +16224,7 @@
                   <c:v>9.625</c:v>
                 </c:pt>
                 <c:pt idx="117" formatCode="General">
-                  <c:v>9.708333333333321</c:v>
+                  <c:v>9.70833333333332</c:v>
                 </c:pt>
                 <c:pt idx="118" formatCode="General">
                   <c:v>9.79166666666666</c:v>
@@ -16389,7 +16389,7 @@
                   <c:v>2.295852879303637</c:v>
                 </c:pt>
                 <c:pt idx="24">
-                  <c:v>2.156868523184745</c:v>
+                  <c:v>2.156868523184744</c:v>
                 </c:pt>
                 <c:pt idx="25">
                   <c:v>0.691094935878203</c:v>
@@ -16754,7 +16754,7 @@
               </c:numCache>
             </c:numRef>
           </c:yVal>
-          <c:smooth val="1"/>
+          <c:smooth val="0"/>
         </c:ser>
         <c:ser>
           <c:idx val="1"/>
@@ -17027,13 +17027,13 @@
                   <c:v>3.975</c:v>
                 </c:pt>
                 <c:pt idx="80">
-                  <c:v>4.024999999999995</c:v>
+                  <c:v>4.024999999999994</c:v>
                 </c:pt>
                 <c:pt idx="81">
                   <c:v>4.075</c:v>
                 </c:pt>
                 <c:pt idx="82">
-                  <c:v>4.124999999999994</c:v>
+                  <c:v>4.124999999999993</c:v>
                 </c:pt>
                 <c:pt idx="83">
                   <c:v>4.175</c:v>
@@ -17045,7 +17045,7 @@
                   <c:v>4.275</c:v>
                 </c:pt>
                 <c:pt idx="86">
-                  <c:v>4.324999999999994</c:v>
+                  <c:v>4.324999999999993</c:v>
                 </c:pt>
                 <c:pt idx="87">
                   <c:v>4.375</c:v>
@@ -17057,13 +17057,13 @@
                   <c:v>4.475</c:v>
                 </c:pt>
                 <c:pt idx="90">
-                  <c:v>4.524999999999995</c:v>
+                  <c:v>4.524999999999994</c:v>
                 </c:pt>
                 <c:pt idx="91">
                   <c:v>4.575</c:v>
                 </c:pt>
                 <c:pt idx="92">
-                  <c:v>4.624999999999993</c:v>
+                  <c:v>4.624999999999991</c:v>
                 </c:pt>
                 <c:pt idx="93">
                   <c:v>4.675</c:v>
@@ -17075,7 +17075,7 @@
                   <c:v>4.775</c:v>
                 </c:pt>
                 <c:pt idx="96">
-                  <c:v>4.824999999999994</c:v>
+                  <c:v>4.824999999999993</c:v>
                 </c:pt>
                 <c:pt idx="97">
                   <c:v>4.875</c:v>
@@ -17087,13 +17087,13 @@
                   <c:v>4.975</c:v>
                 </c:pt>
                 <c:pt idx="100">
-                  <c:v>5.024999999999995</c:v>
+                  <c:v>5.024999999999994</c:v>
                 </c:pt>
                 <c:pt idx="101">
                   <c:v>5.075</c:v>
                 </c:pt>
                 <c:pt idx="102">
-                  <c:v>5.124999999999994</c:v>
+                  <c:v>5.124999999999993</c:v>
                 </c:pt>
                 <c:pt idx="103">
                   <c:v>5.175</c:v>
@@ -17105,7 +17105,7 @@
                   <c:v>5.275</c:v>
                 </c:pt>
                 <c:pt idx="106">
-                  <c:v>5.324999999999994</c:v>
+                  <c:v>5.324999999999993</c:v>
                 </c:pt>
                 <c:pt idx="107">
                   <c:v>5.375</c:v>
@@ -17117,13 +17117,13 @@
                   <c:v>5.475</c:v>
                 </c:pt>
                 <c:pt idx="110">
-                  <c:v>5.524999999999995</c:v>
+                  <c:v>5.524999999999994</c:v>
                 </c:pt>
                 <c:pt idx="111">
                   <c:v>5.575</c:v>
                 </c:pt>
                 <c:pt idx="112">
-                  <c:v>5.624999999999993</c:v>
+                  <c:v>5.624999999999991</c:v>
                 </c:pt>
                 <c:pt idx="113">
                   <c:v>5.675</c:v>
@@ -17135,7 +17135,7 @@
                   <c:v>5.775</c:v>
                 </c:pt>
                 <c:pt idx="116">
-                  <c:v>5.824999999999994</c:v>
+                  <c:v>5.824999999999993</c:v>
                 </c:pt>
                 <c:pt idx="117">
                   <c:v>5.875</c:v>
@@ -17147,13 +17147,13 @@
                   <c:v>5.975</c:v>
                 </c:pt>
                 <c:pt idx="120">
-                  <c:v>6.024999999999995</c:v>
+                  <c:v>6.024999999999994</c:v>
                 </c:pt>
                 <c:pt idx="121">
                   <c:v>6.075</c:v>
                 </c:pt>
                 <c:pt idx="122">
-                  <c:v>6.124999999999994</c:v>
+                  <c:v>6.124999999999993</c:v>
                 </c:pt>
                 <c:pt idx="123">
                   <c:v>6.175</c:v>
@@ -17165,7 +17165,7 @@
                   <c:v>6.275</c:v>
                 </c:pt>
                 <c:pt idx="126">
-                  <c:v>6.324999999999994</c:v>
+                  <c:v>6.324999999999993</c:v>
                 </c:pt>
                 <c:pt idx="127">
                   <c:v>6.375</c:v>
@@ -17177,13 +17177,13 @@
                   <c:v>6.475</c:v>
                 </c:pt>
                 <c:pt idx="130">
-                  <c:v>6.524999999999995</c:v>
+                  <c:v>6.524999999999994</c:v>
                 </c:pt>
                 <c:pt idx="131">
                   <c:v>6.575</c:v>
                 </c:pt>
                 <c:pt idx="132">
-                  <c:v>6.624999999999993</c:v>
+                  <c:v>6.624999999999991</c:v>
                 </c:pt>
                 <c:pt idx="133">
                   <c:v>6.675</c:v>
@@ -17195,7 +17195,7 @@
                   <c:v>6.775</c:v>
                 </c:pt>
                 <c:pt idx="136">
-                  <c:v>6.824999999999994</c:v>
+                  <c:v>6.824999999999993</c:v>
                 </c:pt>
                 <c:pt idx="137">
                   <c:v>6.875</c:v>
@@ -17207,13 +17207,13 @@
                   <c:v>6.975</c:v>
                 </c:pt>
                 <c:pt idx="140">
-                  <c:v>7.024999999999995</c:v>
+                  <c:v>7.024999999999994</c:v>
                 </c:pt>
                 <c:pt idx="141">
                   <c:v>7.075</c:v>
                 </c:pt>
                 <c:pt idx="142">
-                  <c:v>7.124999999999994</c:v>
+                  <c:v>7.124999999999993</c:v>
                 </c:pt>
                 <c:pt idx="143">
                   <c:v>7.175</c:v>
@@ -17225,7 +17225,7 @@
                   <c:v>7.275</c:v>
                 </c:pt>
                 <c:pt idx="146">
-                  <c:v>7.324999999999994</c:v>
+                  <c:v>7.324999999999993</c:v>
                 </c:pt>
                 <c:pt idx="147">
                   <c:v>7.375</c:v>
@@ -17237,13 +17237,13 @@
                   <c:v>7.475</c:v>
                 </c:pt>
                 <c:pt idx="150">
-                  <c:v>7.524999999999995</c:v>
+                  <c:v>7.524999999999994</c:v>
                 </c:pt>
                 <c:pt idx="151">
                   <c:v>7.575</c:v>
                 </c:pt>
                 <c:pt idx="152">
-                  <c:v>7.624999999999993</c:v>
+                  <c:v>7.624999999999991</c:v>
                 </c:pt>
                 <c:pt idx="153">
                   <c:v>7.675</c:v>
@@ -17255,7 +17255,7 @@
                   <c:v>7.775</c:v>
                 </c:pt>
                 <c:pt idx="156">
-                  <c:v>7.824999999999994</c:v>
+                  <c:v>7.824999999999993</c:v>
                 </c:pt>
                 <c:pt idx="157">
                   <c:v>7.875</c:v>
@@ -19744,7 +19744,7 @@
               </c:numCache>
             </c:numRef>
           </c:yVal>
-          <c:smooth val="1"/>
+          <c:smooth val="0"/>
         </c:ser>
         <c:dLbls>
           <c:showLegendKey val="0"/>
@@ -19754,11 +19754,11 @@
           <c:showPercent val="0"/>
           <c:showBubbleSize val="0"/>
         </c:dLbls>
-        <c:axId val="-2079253592"/>
-        <c:axId val="-2077003048"/>
+        <c:axId val="2104269928"/>
+        <c:axId val="2104275800"/>
       </c:scatterChart>
       <c:valAx>
-        <c:axId val="-2079253592"/>
+        <c:axId val="2104269928"/>
         <c:scaling>
           <c:orientation val="minMax"/>
           <c:max val="10.0"/>
@@ -19811,12 +19811,12 @@
             <a:endParaRPr lang="zh-CN"/>
           </a:p>
         </c:txPr>
-        <c:crossAx val="-2077003048"/>
+        <c:crossAx val="2104275800"/>
         <c:crosses val="autoZero"/>
         <c:crossBetween val="midCat"/>
       </c:valAx>
       <c:valAx>
-        <c:axId val="-2077003048"/>
+        <c:axId val="2104275800"/>
         <c:scaling>
           <c:orientation val="minMax"/>
           <c:max val="4.0"/>
@@ -19828,7 +19828,7 @@
         <c:majorTickMark val="out"/>
         <c:minorTickMark val="none"/>
         <c:tickLblPos val="nextTo"/>
-        <c:crossAx val="-2079253592"/>
+        <c:crossAx val="2104269928"/>
         <c:crosses val="autoZero"/>
         <c:crossBetween val="midCat"/>
       </c:valAx>
@@ -20050,7 +20050,7 @@
           <a:p>
             <a:fld id="{5DCA7972-536D-2A4E-B18B-BBFCD42EAECB}" type="datetimeFigureOut">
               <a:rPr kumimoji="1" lang="zh-CN" altLang="en-US" smtClean="0"/>
-              <a:t>11/12/16</a:t>
+              <a:t>12/12/16</a:t>
             </a:fld>
             <a:endParaRPr kumimoji="1" lang="zh-CN" altLang="en-US"/>
           </a:p>
@@ -20220,7 +20220,7 @@
           <a:p>
             <a:fld id="{5DCA7972-536D-2A4E-B18B-BBFCD42EAECB}" type="datetimeFigureOut">
               <a:rPr kumimoji="1" lang="zh-CN" altLang="en-US" smtClean="0"/>
-              <a:t>11/12/16</a:t>
+              <a:t>12/12/16</a:t>
             </a:fld>
             <a:endParaRPr kumimoji="1" lang="zh-CN" altLang="en-US"/>
           </a:p>
@@ -20400,7 +20400,7 @@
           <a:p>
             <a:fld id="{5DCA7972-536D-2A4E-B18B-BBFCD42EAECB}" type="datetimeFigureOut">
               <a:rPr kumimoji="1" lang="zh-CN" altLang="en-US" smtClean="0"/>
-              <a:t>11/12/16</a:t>
+              <a:t>12/12/16</a:t>
             </a:fld>
             <a:endParaRPr kumimoji="1" lang="zh-CN" altLang="en-US"/>
           </a:p>
@@ -20570,7 +20570,7 @@
           <a:p>
             <a:fld id="{5DCA7972-536D-2A4E-B18B-BBFCD42EAECB}" type="datetimeFigureOut">
               <a:rPr kumimoji="1" lang="zh-CN" altLang="en-US" smtClean="0"/>
-              <a:t>11/12/16</a:t>
+              <a:t>12/12/16</a:t>
             </a:fld>
             <a:endParaRPr kumimoji="1" lang="zh-CN" altLang="en-US"/>
           </a:p>
@@ -20816,7 +20816,7 @@
           <a:p>
             <a:fld id="{5DCA7972-536D-2A4E-B18B-BBFCD42EAECB}" type="datetimeFigureOut">
               <a:rPr kumimoji="1" lang="zh-CN" altLang="en-US" smtClean="0"/>
-              <a:t>11/12/16</a:t>
+              <a:t>12/12/16</a:t>
             </a:fld>
             <a:endParaRPr kumimoji="1" lang="zh-CN" altLang="en-US"/>
           </a:p>
@@ -21104,7 +21104,7 @@
           <a:p>
             <a:fld id="{5DCA7972-536D-2A4E-B18B-BBFCD42EAECB}" type="datetimeFigureOut">
               <a:rPr kumimoji="1" lang="zh-CN" altLang="en-US" smtClean="0"/>
-              <a:t>11/12/16</a:t>
+              <a:t>12/12/16</a:t>
             </a:fld>
             <a:endParaRPr kumimoji="1" lang="zh-CN" altLang="en-US"/>
           </a:p>
@@ -21526,7 +21526,7 @@
           <a:p>
             <a:fld id="{5DCA7972-536D-2A4E-B18B-BBFCD42EAECB}" type="datetimeFigureOut">
               <a:rPr kumimoji="1" lang="zh-CN" altLang="en-US" smtClean="0"/>
-              <a:t>11/12/16</a:t>
+              <a:t>12/12/16</a:t>
             </a:fld>
             <a:endParaRPr kumimoji="1" lang="zh-CN" altLang="en-US"/>
           </a:p>
@@ -21644,7 +21644,7 @@
           <a:p>
             <a:fld id="{5DCA7972-536D-2A4E-B18B-BBFCD42EAECB}" type="datetimeFigureOut">
               <a:rPr kumimoji="1" lang="zh-CN" altLang="en-US" smtClean="0"/>
-              <a:t>11/12/16</a:t>
+              <a:t>12/12/16</a:t>
             </a:fld>
             <a:endParaRPr kumimoji="1" lang="zh-CN" altLang="en-US"/>
           </a:p>
@@ -21739,7 +21739,7 @@
           <a:p>
             <a:fld id="{5DCA7972-536D-2A4E-B18B-BBFCD42EAECB}" type="datetimeFigureOut">
               <a:rPr kumimoji="1" lang="zh-CN" altLang="en-US" smtClean="0"/>
-              <a:t>11/12/16</a:t>
+              <a:t>12/12/16</a:t>
             </a:fld>
             <a:endParaRPr kumimoji="1" lang="zh-CN" altLang="en-US"/>
           </a:p>
@@ -22016,7 +22016,7 @@
           <a:p>
             <a:fld id="{5DCA7972-536D-2A4E-B18B-BBFCD42EAECB}" type="datetimeFigureOut">
               <a:rPr kumimoji="1" lang="zh-CN" altLang="en-US" smtClean="0"/>
-              <a:t>11/12/16</a:t>
+              <a:t>12/12/16</a:t>
             </a:fld>
             <a:endParaRPr kumimoji="1" lang="zh-CN" altLang="en-US"/>
           </a:p>
@@ -22269,7 +22269,7 @@
           <a:p>
             <a:fld id="{5DCA7972-536D-2A4E-B18B-BBFCD42EAECB}" type="datetimeFigureOut">
               <a:rPr kumimoji="1" lang="zh-CN" altLang="en-US" smtClean="0"/>
-              <a:t>11/12/16</a:t>
+              <a:t>12/12/16</a:t>
             </a:fld>
             <a:endParaRPr kumimoji="1" lang="zh-CN" altLang="en-US"/>
           </a:p>
@@ -22482,7 +22482,7 @@
           <a:p>
             <a:fld id="{5DCA7972-536D-2A4E-B18B-BBFCD42EAECB}" type="datetimeFigureOut">
               <a:rPr kumimoji="1" lang="zh-CN" altLang="en-US" smtClean="0"/>
-              <a:t>11/12/16</a:t>
+              <a:t>12/12/16</a:t>
             </a:fld>
             <a:endParaRPr kumimoji="1" lang="zh-CN" altLang="en-US"/>
           </a:p>
@@ -22934,7 +22934,7 @@
           <p:nvPr>
             <p:extLst>
               <p:ext uri="{D42A27DB-BD31-4B8C-83A1-F6EECF244321}">
-                <p14:modId xmlns:p14="http://schemas.microsoft.com/office/powerpoint/2010/main" val="3841363971"/>
+                <p14:modId xmlns:p14="http://schemas.microsoft.com/office/powerpoint/2010/main" val="721086694"/>
               </p:ext>
             </p:extLst>
           </p:nvPr>
@@ -22958,7 +22958,7 @@
           <p:nvPr>
             <p:extLst>
               <p:ext uri="{D42A27DB-BD31-4B8C-83A1-F6EECF244321}">
-                <p14:modId xmlns:p14="http://schemas.microsoft.com/office/powerpoint/2010/main" val="93005845"/>
+                <p14:modId xmlns:p14="http://schemas.microsoft.com/office/powerpoint/2010/main" val="2347595158"/>
               </p:ext>
             </p:extLst>
           </p:nvPr>

</xml_diff>